<commit_message>
finalizing HW 1 and LDA/QDA HW
</commit_message>
<xml_diff>
--- a/Mod0/Probability+Distributions+Assignment.pptx
+++ b/Mod0/Probability+Distributions+Assignment.pptx
@@ -274,7 +274,7 @@
           <a:p>
             <a:fld id="{70DAC3A1-42A1-421A-8CF7-D5228AFF269C}" type="datetimeFigureOut">
               <a:rPr lang="en-US" smtClean="0"/>
-              <a:t>8/30/2021</a:t>
+              <a:t>9/18/2021</a:t>
             </a:fld>
             <a:endParaRPr lang="en-US"/>
           </a:p>
@@ -472,7 +472,7 @@
           <a:p>
             <a:fld id="{70DAC3A1-42A1-421A-8CF7-D5228AFF269C}" type="datetimeFigureOut">
               <a:rPr lang="en-US" smtClean="0"/>
-              <a:t>8/30/2021</a:t>
+              <a:t>9/18/2021</a:t>
             </a:fld>
             <a:endParaRPr lang="en-US"/>
           </a:p>
@@ -680,7 +680,7 @@
           <a:p>
             <a:fld id="{70DAC3A1-42A1-421A-8CF7-D5228AFF269C}" type="datetimeFigureOut">
               <a:rPr lang="en-US" smtClean="0"/>
-              <a:t>8/30/2021</a:t>
+              <a:t>9/18/2021</a:t>
             </a:fld>
             <a:endParaRPr lang="en-US"/>
           </a:p>
@@ -878,7 +878,7 @@
           <a:p>
             <a:fld id="{70DAC3A1-42A1-421A-8CF7-D5228AFF269C}" type="datetimeFigureOut">
               <a:rPr lang="en-US" smtClean="0"/>
-              <a:t>8/30/2021</a:t>
+              <a:t>9/18/2021</a:t>
             </a:fld>
             <a:endParaRPr lang="en-US"/>
           </a:p>
@@ -1153,7 +1153,7 @@
           <a:p>
             <a:fld id="{70DAC3A1-42A1-421A-8CF7-D5228AFF269C}" type="datetimeFigureOut">
               <a:rPr lang="en-US" smtClean="0"/>
-              <a:t>8/30/2021</a:t>
+              <a:t>9/18/2021</a:t>
             </a:fld>
             <a:endParaRPr lang="en-US"/>
           </a:p>
@@ -1418,7 +1418,7 @@
           <a:p>
             <a:fld id="{70DAC3A1-42A1-421A-8CF7-D5228AFF269C}" type="datetimeFigureOut">
               <a:rPr lang="en-US" smtClean="0"/>
-              <a:t>8/30/2021</a:t>
+              <a:t>9/18/2021</a:t>
             </a:fld>
             <a:endParaRPr lang="en-US"/>
           </a:p>
@@ -1830,7 +1830,7 @@
           <a:p>
             <a:fld id="{70DAC3A1-42A1-421A-8CF7-D5228AFF269C}" type="datetimeFigureOut">
               <a:rPr lang="en-US" smtClean="0"/>
-              <a:t>8/30/2021</a:t>
+              <a:t>9/18/2021</a:t>
             </a:fld>
             <a:endParaRPr lang="en-US"/>
           </a:p>
@@ -1971,7 +1971,7 @@
           <a:p>
             <a:fld id="{70DAC3A1-42A1-421A-8CF7-D5228AFF269C}" type="datetimeFigureOut">
               <a:rPr lang="en-US" smtClean="0"/>
-              <a:t>8/30/2021</a:t>
+              <a:t>9/18/2021</a:t>
             </a:fld>
             <a:endParaRPr lang="en-US"/>
           </a:p>
@@ -2084,7 +2084,7 @@
           <a:p>
             <a:fld id="{70DAC3A1-42A1-421A-8CF7-D5228AFF269C}" type="datetimeFigureOut">
               <a:rPr lang="en-US" smtClean="0"/>
-              <a:t>8/30/2021</a:t>
+              <a:t>9/18/2021</a:t>
             </a:fld>
             <a:endParaRPr lang="en-US"/>
           </a:p>
@@ -2395,7 +2395,7 @@
           <a:p>
             <a:fld id="{70DAC3A1-42A1-421A-8CF7-D5228AFF269C}" type="datetimeFigureOut">
               <a:rPr lang="en-US" smtClean="0"/>
-              <a:t>8/30/2021</a:t>
+              <a:t>9/18/2021</a:t>
             </a:fld>
             <a:endParaRPr lang="en-US"/>
           </a:p>
@@ -2683,7 +2683,7 @@
           <a:p>
             <a:fld id="{70DAC3A1-42A1-421A-8CF7-D5228AFF269C}" type="datetimeFigureOut">
               <a:rPr lang="en-US" smtClean="0"/>
-              <a:t>8/30/2021</a:t>
+              <a:t>9/18/2021</a:t>
             </a:fld>
             <a:endParaRPr lang="en-US"/>
           </a:p>
@@ -2924,7 +2924,7 @@
           <a:p>
             <a:fld id="{70DAC3A1-42A1-421A-8CF7-D5228AFF269C}" type="datetimeFigureOut">
               <a:rPr lang="en-US" smtClean="0"/>
-              <a:t>8/30/2021</a:t>
+              <a:t>9/18/2021</a:t>
             </a:fld>
             <a:endParaRPr lang="en-US"/>
           </a:p>
@@ -3539,8 +3539,8 @@
           </a:p>
         </p:txBody>
       </p:sp>
-      <mc:AlternateContent xmlns:mc="http://schemas.openxmlformats.org/markup-compatibility/2006">
-        <mc:Choice xmlns:a14="http://schemas.microsoft.com/office/drawing/2010/main" Requires="a14">
+      <mc:AlternateContent xmlns:mc="http://schemas.openxmlformats.org/markup-compatibility/2006" xmlns:a14="http://schemas.microsoft.com/office/drawing/2010/main">
+        <mc:Choice Requires="a14">
           <p:graphicFrame>
             <p:nvGraphicFramePr>
               <p:cNvPr id="15" name="Table 15">
@@ -3862,7 +3862,7 @@
             </a:graphic>
           </p:graphicFrame>
         </mc:Choice>
-        <mc:Fallback>
+        <mc:Fallback xmlns="">
           <p:graphicFrame>
             <p:nvGraphicFramePr>
               <p:cNvPr id="15" name="Table 15">
@@ -4454,8 +4454,8 @@
           </a:p>
         </p:txBody>
       </p:sp>
-      <mc:AlternateContent xmlns:mc="http://schemas.openxmlformats.org/markup-compatibility/2006">
-        <mc:Choice xmlns:a14="http://schemas.microsoft.com/office/drawing/2010/main" Requires="a14">
+      <mc:AlternateContent xmlns:mc="http://schemas.openxmlformats.org/markup-compatibility/2006" xmlns:a14="http://schemas.microsoft.com/office/drawing/2010/main">
+        <mc:Choice Requires="a14">
           <p:graphicFrame>
             <p:nvGraphicFramePr>
               <p:cNvPr id="15" name="Table 15">
@@ -4555,6 +4555,7 @@
                         <a:bodyPr/>
                         <a:lstStyle/>
                         <a:p>
+                          <a:pPr/>
                           <a14:m>
                             <m:oMathPara xmlns:m="http://schemas.openxmlformats.org/officeDocument/2006/math">
                               <m:oMathParaPr>
@@ -4620,6 +4621,7 @@
                           <a:endParaRPr lang="en-US" sz="1400" b="0" dirty="0"/>
                         </a:p>
                         <a:p>
+                          <a:pPr/>
                           <a14:m>
                             <m:oMathPara xmlns:m="http://schemas.openxmlformats.org/officeDocument/2006/math">
                               <m:oMathParaPr>
@@ -4745,6 +4747,7 @@
                         <a:bodyPr/>
                         <a:lstStyle/>
                         <a:p>
+                          <a:pPr/>
                           <a14:m>
                             <m:oMathPara xmlns:m="http://schemas.openxmlformats.org/officeDocument/2006/math">
                               <m:oMathParaPr>
@@ -4895,6 +4898,7 @@
                           </a:endParaRPr>
                         </a:p>
                         <a:p>
+                          <a:pPr/>
                           <a14:m>
                             <m:oMathPara xmlns:m="http://schemas.openxmlformats.org/officeDocument/2006/math">
                               <m:oMathParaPr>
@@ -5088,7 +5092,7 @@
             </a:graphic>
           </p:graphicFrame>
         </mc:Choice>
-        <mc:Fallback>
+        <mc:Fallback xmlns="">
           <p:graphicFrame>
             <p:nvGraphicFramePr>
               <p:cNvPr id="15" name="Table 15">
@@ -5662,8 +5666,8 @@
           </a:p>
         </p:txBody>
       </p:sp>
-      <mc:AlternateContent xmlns:mc="http://schemas.openxmlformats.org/markup-compatibility/2006">
-        <mc:Choice xmlns:a14="http://schemas.microsoft.com/office/drawing/2010/main" Requires="a14">
+      <mc:AlternateContent xmlns:mc="http://schemas.openxmlformats.org/markup-compatibility/2006" xmlns:a14="http://schemas.microsoft.com/office/drawing/2010/main">
+        <mc:Choice Requires="a14">
           <p:graphicFrame>
             <p:nvGraphicFramePr>
               <p:cNvPr id="15" name="Table 15">
@@ -5826,6 +5830,7 @@
                           </a:r>
                         </a:p>
                         <a:p>
+                          <a:pPr/>
                           <a14:m>
                             <m:oMathPara xmlns:m="http://schemas.openxmlformats.org/officeDocument/2006/math">
                               <m:oMathParaPr>
@@ -5926,6 +5931,7 @@
                           <a:endParaRPr lang="en-US" sz="1100" b="0" dirty="0"/>
                         </a:p>
                         <a:p>
+                          <a:pPr/>
                           <a14:m>
                             <m:oMathPara xmlns:m="http://schemas.openxmlformats.org/officeDocument/2006/math">
                               <m:oMathParaPr>
@@ -6009,6 +6015,7 @@
                         <a:bodyPr/>
                         <a:lstStyle/>
                         <a:p>
+                          <a:pPr/>
                           <a14:m>
                             <m:oMathPara xmlns:m="http://schemas.openxmlformats.org/officeDocument/2006/math">
                               <m:oMathParaPr>
@@ -6446,7 +6453,7 @@
             </a:graphic>
           </p:graphicFrame>
         </mc:Choice>
-        <mc:Fallback>
+        <mc:Fallback xmlns="">
           <p:graphicFrame>
             <p:nvGraphicFramePr>
               <p:cNvPr id="15" name="Table 15">
@@ -7025,8 +7032,8 @@
           </a:p>
         </p:txBody>
       </p:sp>
-      <mc:AlternateContent xmlns:mc="http://schemas.openxmlformats.org/markup-compatibility/2006">
-        <mc:Choice xmlns:a14="http://schemas.microsoft.com/office/drawing/2010/main" Requires="a14">
+      <mc:AlternateContent xmlns:mc="http://schemas.openxmlformats.org/markup-compatibility/2006" xmlns:a14="http://schemas.microsoft.com/office/drawing/2010/main">
+        <mc:Choice Requires="a14">
           <p:graphicFrame>
             <p:nvGraphicFramePr>
               <p:cNvPr id="15" name="Table 15">
@@ -7225,6 +7232,7 @@
                           <a:endParaRPr lang="en-US" sz="1600" b="1" dirty="0"/>
                         </a:p>
                         <a:p>
+                          <a:pPr/>
                           <a14:m>
                             <m:oMathPara xmlns:m="http://schemas.openxmlformats.org/officeDocument/2006/math">
                               <m:oMathParaPr>
@@ -7582,7 +7590,7 @@
             </a:graphic>
           </p:graphicFrame>
         </mc:Choice>
-        <mc:Fallback>
+        <mc:Fallback xmlns="">
           <p:graphicFrame>
             <p:nvGraphicFramePr>
               <p:cNvPr id="15" name="Table 15">
@@ -8232,8 +8240,8 @@
           </a:p>
         </p:txBody>
       </p:sp>
-      <mc:AlternateContent xmlns:mc="http://schemas.openxmlformats.org/markup-compatibility/2006">
-        <mc:Choice xmlns:a14="http://schemas.microsoft.com/office/drawing/2010/main" Requires="a14">
+      <mc:AlternateContent xmlns:mc="http://schemas.openxmlformats.org/markup-compatibility/2006" xmlns:a14="http://schemas.microsoft.com/office/drawing/2010/main">
+        <mc:Choice Requires="a14">
           <p:graphicFrame>
             <p:nvGraphicFramePr>
               <p:cNvPr id="15" name="Table 15">
@@ -8333,6 +8341,7 @@
                         <a:bodyPr/>
                         <a:lstStyle/>
                         <a:p>
+                          <a:pPr/>
                           <a14:m>
                             <m:oMathPara xmlns:m="http://schemas.openxmlformats.org/officeDocument/2006/math">
                               <m:oMathParaPr>
@@ -8471,6 +8480,7 @@
                           <a:endParaRPr lang="en-US" sz="1400" b="1" dirty="0"/>
                         </a:p>
                         <a:p>
+                          <a:pPr/>
                           <a14:m>
                             <m:oMathPara xmlns:m="http://schemas.openxmlformats.org/officeDocument/2006/math">
                               <m:oMathParaPr>
@@ -8539,6 +8549,7 @@
                           <a:endParaRPr lang="en-US" sz="1400" b="1" dirty="0"/>
                         </a:p>
                         <a:p>
+                          <a:pPr/>
                           <a14:m>
                             <m:oMathPara xmlns:m="http://schemas.openxmlformats.org/officeDocument/2006/math">
                               <m:oMathParaPr>
@@ -8655,6 +8666,7 @@
                         <a:bodyPr/>
                         <a:lstStyle/>
                         <a:p>
+                          <a:pPr/>
                           <a14:m>
                             <m:oMathPara xmlns:m="http://schemas.openxmlformats.org/officeDocument/2006/math">
                               <m:oMathParaPr>
@@ -8899,7 +8911,7 @@
             </a:graphic>
           </p:graphicFrame>
         </mc:Choice>
-        <mc:Fallback>
+        <mc:Fallback xmlns="">
           <p:graphicFrame>
             <p:nvGraphicFramePr>
               <p:cNvPr id="15" name="Table 15">
@@ -9457,8 +9469,8 @@
           </a:p>
         </p:txBody>
       </p:sp>
-      <mc:AlternateContent xmlns:mc="http://schemas.openxmlformats.org/markup-compatibility/2006">
-        <mc:Choice xmlns:a14="http://schemas.microsoft.com/office/drawing/2010/main" Requires="a14">
+      <mc:AlternateContent xmlns:mc="http://schemas.openxmlformats.org/markup-compatibility/2006" xmlns:a14="http://schemas.microsoft.com/office/drawing/2010/main">
+        <mc:Choice Requires="a14">
           <p:graphicFrame>
             <p:nvGraphicFramePr>
               <p:cNvPr id="15" name="Table 15">
@@ -9969,7 +9981,7 @@
             </a:graphic>
           </p:graphicFrame>
         </mc:Choice>
-        <mc:Fallback>
+        <mc:Fallback xmlns="">
           <p:graphicFrame>
             <p:nvGraphicFramePr>
               <p:cNvPr id="15" name="Table 15">
@@ -10126,7 +10138,7 @@
                               <a:latin typeface="+mn-lt"/>
                               <a:ea typeface="+mn-ea"/>
                               <a:cs typeface="+mn-cs"/>
-                              <a:hlinkClick r:id="rId2" tooltip="Degrees of freedom (statistics)"/>
+                              <a:hlinkClick r:id="rId5" tooltip="Degrees of freedom (statistics)"/>
                             </a:rPr>
                             <a:t>degrees of freedom</a:t>
                           </a:r>
@@ -10166,7 +10178,7 @@
                               <a:latin typeface="+mn-lt"/>
                               <a:ea typeface="+mn-ea"/>
                               <a:cs typeface="+mn-cs"/>
-                              <a:hlinkClick r:id="rId3" tooltip="Scale matrix"/>
+                              <a:hlinkClick r:id="rId6" tooltip="Scale matrix"/>
                             </a:rPr>
                             <a:t>scale matrix</a:t>
                           </a:r>
@@ -10239,7 +10251,7 @@
                               <a:latin typeface="+mn-lt"/>
                               <a:ea typeface="+mn-ea"/>
                               <a:cs typeface="+mn-cs"/>
-                              <a:hlinkClick r:id="rId4" tooltip="Positive definite matrix"/>
+                              <a:hlinkClick r:id="rId7" tooltip="Positive definite matrix"/>
                             </a:rPr>
                             <a:t>pos. def</a:t>
                           </a:r>
@@ -10366,7 +10378,7 @@
                               <a:latin typeface="+mn-lt"/>
                               <a:ea typeface="+mn-ea"/>
                               <a:cs typeface="+mn-cs"/>
-                              <a:hlinkClick r:id="rId4" tooltip="Positive definite matrix"/>
+                              <a:hlinkClick r:id="rId7" tooltip="Positive definite matrix"/>
                             </a:rPr>
                             <a:t>positive definite matrix</a:t>
                           </a:r>
@@ -10392,7 +10404,7 @@
                       </a:txBody>
                       <a:tcPr>
                         <a:blipFill>
-                          <a:blip r:embed="rId5"/>
+                          <a:blip r:embed="rId8"/>
                           <a:stretch>
                             <a:fillRect l="-398" t="-375641" r="-170120" b="-2564"/>
                           </a:stretch>
@@ -10409,7 +10421,7 @@
                       </a:txBody>
                       <a:tcPr>
                         <a:blipFill>
-                          <a:blip r:embed="rId5"/>
+                          <a:blip r:embed="rId8"/>
                           <a:stretch>
                             <a:fillRect l="-59434" t="-375641" r="-708" b="-2564"/>
                           </a:stretch>
@@ -10553,7 +10565,7 @@
             </a:r>
             <a:r>
               <a:rPr lang="en-US" sz="1400" dirty="0">
-                <a:hlinkClick r:id="rId6" tooltip="Bayesian inference"/>
+                <a:hlinkClick r:id="rId9" tooltip="Bayesian inference"/>
               </a:rPr>
               <a:t>Bayesian statistics</a:t>
             </a:r>
@@ -10563,7 +10575,7 @@
             </a:r>
             <a:r>
               <a:rPr lang="en-US" sz="1400" dirty="0">
-                <a:hlinkClick r:id="rId7" tooltip="Conjugate prior"/>
+                <a:hlinkClick r:id="rId10" tooltip="Conjugate prior"/>
               </a:rPr>
               <a:t>conjugate prior</a:t>
             </a:r>
@@ -10573,7 +10585,7 @@
             </a:r>
             <a:r>
               <a:rPr lang="en-US" sz="1400" dirty="0">
-                <a:hlinkClick r:id="rId8" tooltip="Matrix inverse"/>
+                <a:hlinkClick r:id="rId11" tooltip="Matrix inverse"/>
               </a:rPr>
               <a:t>inverse</a:t>
             </a:r>
@@ -10583,7 +10595,7 @@
             </a:r>
             <a:r>
               <a:rPr lang="en-US" sz="1400" dirty="0">
-                <a:hlinkClick r:id="rId9" tooltip="Covariance matrix"/>
+                <a:hlinkClick r:id="rId12" tooltip="Covariance matrix"/>
               </a:rPr>
               <a:t>covariance-matrix</a:t>
             </a:r>
@@ -10593,7 +10605,7 @@
             </a:r>
             <a:r>
               <a:rPr lang="en-US" sz="1400" dirty="0">
-                <a:hlinkClick r:id="rId10"/>
+                <a:hlinkClick r:id="rId13"/>
               </a:rPr>
               <a:t>multivariate-normal random-vector</a:t>
             </a:r>
@@ -10641,7 +10653,7 @@
           <a:p>
             <a:r>
               <a:rPr lang="en-US" sz="1000" dirty="0">
-                <a:hlinkClick r:id="rId11"/>
+                <a:hlinkClick r:id="rId14"/>
               </a:rPr>
               <a:t>Wishart distribution - Wikipedia</a:t>
             </a:r>
@@ -10700,7 +10712,7 @@
           <p:nvPr/>
         </p:nvPicPr>
         <p:blipFill>
-          <a:blip r:embed="rId12"/>
+          <a:blip r:embed="rId15"/>
           <a:stretch>
             <a:fillRect/>
           </a:stretch>
@@ -10730,7 +10742,7 @@
           <p:nvPr/>
         </p:nvPicPr>
         <p:blipFill>
-          <a:blip r:embed="rId13"/>
+          <a:blip r:embed="rId16"/>
           <a:stretch>
             <a:fillRect/>
           </a:stretch>
@@ -10827,8 +10839,8 @@
           </a:p>
         </p:txBody>
       </p:sp>
-      <mc:AlternateContent xmlns:mc="http://schemas.openxmlformats.org/markup-compatibility/2006" xmlns:a14="http://schemas.microsoft.com/office/drawing/2010/main">
-        <mc:Choice Requires="a14">
+      <mc:AlternateContent xmlns:mc="http://schemas.openxmlformats.org/markup-compatibility/2006">
+        <mc:Choice xmlns:a14="http://schemas.microsoft.com/office/drawing/2010/main" Requires="a14">
           <p:sp>
             <p:nvSpPr>
               <p:cNvPr id="4" name="Content Placeholder 3">
@@ -10881,7 +10893,7 @@
                         <a:rPr lang="en-US" b="0" i="1" smtClean="0">
                           <a:latin typeface="Cambria Math" panose="02040503050406030204" pitchFamily="18" charset="0"/>
                         </a:rPr>
-                        <m:t>=50,</m:t>
+                        <m:t>=43,</m:t>
                       </m:r>
                       <m:r>
                         <a:rPr lang="en-US" b="0" i="1" smtClean="0">
@@ -10893,7 +10905,7 @@
                         <a:rPr lang="en-US" b="0" i="1" smtClean="0">
                           <a:latin typeface="Cambria Math" panose="02040503050406030204" pitchFamily="18" charset="0"/>
                         </a:rPr>
-                        <m:t>=∎|</m:t>
+                        <m:t>=0.8 |</m:t>
                       </m:r>
                       <m:r>
                         <a:rPr lang="en-US" b="0" i="1" smtClean="0">
@@ -10912,10 +10924,34 @@
                 </a14:m>
                 <a:endParaRPr lang="en-US" dirty="0"/>
               </a:p>
+              <a:p>
+                <a:pPr marL="0" indent="0">
+                  <a:buNone/>
+                </a:pPr>
+                <a:endParaRPr lang="en-US" dirty="0"/>
+              </a:p>
+              <a:p>
+                <a:pPr marL="0" indent="0">
+                  <a:buNone/>
+                </a:pPr>
+                <a:r>
+                  <a:rPr lang="en-US" sz="2400" dirty="0"/>
+                  <a:t>For the discrete binomial distribution:</a:t>
+                </a:r>
+              </a:p>
+              <a:p>
+                <a:pPr marL="0" indent="0">
+                  <a:buNone/>
+                </a:pPr>
+                <a:r>
+                  <a:rPr lang="en-US" sz="2400" dirty="0"/>
+                  <a:t>L(n=43,p=0.8|k=21) = p(k=21|n=43,p=0.8) = 4.06992e-06</a:t>
+                </a:r>
+              </a:p>
             </p:txBody>
           </p:sp>
         </mc:Choice>
-        <mc:Fallback xmlns="">
+        <mc:Fallback>
           <p:sp>
             <p:nvSpPr>
               <p:cNvPr id="4" name="Content Placeholder 3">
@@ -10936,7 +10972,7 @@
               <a:blipFill>
                 <a:blip r:embed="rId3"/>
                 <a:stretch>
-                  <a:fillRect/>
+                  <a:fillRect l="-1891"/>
                 </a:stretch>
               </a:blipFill>
             </p:spPr>
@@ -10955,8 +10991,8 @@
           </p:sp>
         </mc:Fallback>
       </mc:AlternateContent>
-      <mc:AlternateContent xmlns:mc="http://schemas.openxmlformats.org/markup-compatibility/2006" xmlns:a14="http://schemas.microsoft.com/office/drawing/2010/main">
-        <mc:Choice Requires="a14">
+      <mc:AlternateContent xmlns:mc="http://schemas.openxmlformats.org/markup-compatibility/2006">
+        <mc:Choice xmlns:a14="http://schemas.microsoft.com/office/drawing/2010/main" Requires="a14">
           <p:sp>
             <p:nvSpPr>
               <p:cNvPr id="6" name="Content Placeholder 5">
@@ -11014,13 +11050,9 @@
                       </m:r>
                       <m:r>
                         <a:rPr lang="en-US" b="0" i="1" smtClean="0">
-                          <a:solidFill>
-                            <a:srgbClr val="FF0000"/>
-                          </a:solidFill>
                           <a:latin typeface="Cambria Math" panose="02040503050406030204" pitchFamily="18" charset="0"/>
-                          <a:ea typeface="Cambria Math" panose="02040503050406030204" pitchFamily="18" charset="0"/>
                         </a:rPr>
-                        <m:t>∎</m:t>
+                        <m:t>10</m:t>
                       </m:r>
                       <m:r>
                         <a:rPr lang="en-US" b="0" i="1" smtClean="0">
@@ -11043,13 +11075,9 @@
                       </m:r>
                       <m:r>
                         <a:rPr lang="en-US" b="0" i="1" smtClean="0">
-                          <a:solidFill>
-                            <a:srgbClr val="FF0000"/>
-                          </a:solidFill>
                           <a:latin typeface="Cambria Math" panose="02040503050406030204" pitchFamily="18" charset="0"/>
-                          <a:ea typeface="Cambria Math" panose="02040503050406030204" pitchFamily="18" charset="0"/>
                         </a:rPr>
-                        <m:t>∎</m:t>
+                        <m:t>2</m:t>
                       </m:r>
                       <m:r>
                         <a:rPr lang="en-US" b="0" i="1" smtClean="0">
@@ -11078,12 +11106,30 @@
                 <a:pPr marL="0" indent="0">
                   <a:buNone/>
                 </a:pPr>
-                <a:endParaRPr lang="en-US" dirty="0"/>
+                <a:endParaRPr lang="en-US" sz="2400" dirty="0"/>
+              </a:p>
+              <a:p>
+                <a:pPr marL="0" indent="0">
+                  <a:buNone/>
+                </a:pPr>
+                <a:r>
+                  <a:rPr lang="en-US" sz="2400" dirty="0"/>
+                  <a:t>For the continuous gaussian distribution:</a:t>
+                </a:r>
+              </a:p>
+              <a:p>
+                <a:pPr marL="0" indent="0">
+                  <a:buNone/>
+                </a:pPr>
+                <a:r>
+                  <a:rPr lang="en-US" sz="2400" dirty="0"/>
+                  <a:t>L(μ=10,σ=2|x=7) = f(x=7|μ=10,σ=2) = 0.06476</a:t>
+                </a:r>
               </a:p>
             </p:txBody>
           </p:sp>
         </mc:Choice>
-        <mc:Fallback xmlns="">
+        <mc:Fallback>
           <p:sp>
             <p:nvSpPr>
               <p:cNvPr id="6" name="Content Placeholder 5">
@@ -11104,7 +11150,7 @@
               <a:blipFill>
                 <a:blip r:embed="rId4"/>
                 <a:stretch>
-                  <a:fillRect/>
+                  <a:fillRect l="-1882"/>
                 </a:stretch>
               </a:blipFill>
             </p:spPr>
@@ -14451,8 +14497,8 @@
           </a:p>
         </p:txBody>
       </p:sp>
-      <mc:AlternateContent xmlns:mc="http://schemas.openxmlformats.org/markup-compatibility/2006">
-        <mc:Choice xmlns:a14="http://schemas.microsoft.com/office/drawing/2010/main" Requires="a14">
+      <mc:AlternateContent xmlns:mc="http://schemas.openxmlformats.org/markup-compatibility/2006" xmlns:a14="http://schemas.microsoft.com/office/drawing/2010/main">
+        <mc:Choice Requires="a14">
           <p:graphicFrame>
             <p:nvGraphicFramePr>
               <p:cNvPr id="15" name="Table 15">
@@ -14752,6 +14798,7 @@
                         <a:bodyPr/>
                         <a:lstStyle/>
                         <a:p>
+                          <a:pPr/>
                           <a14:m>
                             <m:oMathPara xmlns:m="http://schemas.openxmlformats.org/officeDocument/2006/math">
                               <m:oMathParaPr>
@@ -15099,7 +15146,7 @@
             </a:graphic>
           </p:graphicFrame>
         </mc:Choice>
-        <mc:Fallback>
+        <mc:Fallback xmlns="">
           <p:graphicFrame>
             <p:nvGraphicFramePr>
               <p:cNvPr id="15" name="Table 15">
@@ -15635,8 +15682,8 @@
           </a:p>
         </p:txBody>
       </p:sp>
-      <mc:AlternateContent xmlns:mc="http://schemas.openxmlformats.org/markup-compatibility/2006">
-        <mc:Choice xmlns:a14="http://schemas.microsoft.com/office/drawing/2010/main" Requires="a14">
+      <mc:AlternateContent xmlns:mc="http://schemas.openxmlformats.org/markup-compatibility/2006" xmlns:a14="http://schemas.microsoft.com/office/drawing/2010/main">
+        <mc:Choice Requires="a14">
           <p:graphicFrame>
             <p:nvGraphicFramePr>
               <p:cNvPr id="15" name="Table 15">
@@ -15736,6 +15783,7 @@
                         <a:bodyPr/>
                         <a:lstStyle/>
                         <a:p>
+                          <a:pPr/>
                           <a14:m>
                             <m:oMathPara xmlns:m="http://schemas.openxmlformats.org/officeDocument/2006/math">
                               <m:oMathParaPr>
@@ -15764,6 +15812,7 @@
                           </a:endParaRPr>
                         </a:p>
                         <a:p>
+                          <a:pPr/>
                           <a14:m>
                             <m:oMathPara xmlns:m="http://schemas.openxmlformats.org/officeDocument/2006/math">
                               <m:oMathParaPr>
@@ -15817,6 +15866,7 @@
                         <a:bodyPr/>
                         <a:lstStyle/>
                         <a:p>
+                          <a:pPr/>
                           <a14:m>
                             <m:oMathPara xmlns:m="http://schemas.openxmlformats.org/officeDocument/2006/math">
                               <m:oMathParaPr>
@@ -16152,7 +16202,7 @@
             </a:graphic>
           </p:graphicFrame>
         </mc:Choice>
-        <mc:Fallback>
+        <mc:Fallback xmlns="">
           <p:graphicFrame>
             <p:nvGraphicFramePr>
               <p:cNvPr id="15" name="Table 15">
@@ -16730,8 +16780,8 @@
           </a:p>
         </p:txBody>
       </p:sp>
-      <mc:AlternateContent xmlns:mc="http://schemas.openxmlformats.org/markup-compatibility/2006">
-        <mc:Choice xmlns:a14="http://schemas.microsoft.com/office/drawing/2010/main" Requires="a14">
+      <mc:AlternateContent xmlns:mc="http://schemas.openxmlformats.org/markup-compatibility/2006" xmlns:a14="http://schemas.microsoft.com/office/drawing/2010/main">
+        <mc:Choice Requires="a14">
           <p:graphicFrame>
             <p:nvGraphicFramePr>
               <p:cNvPr id="15" name="Table 15">
@@ -16831,6 +16881,7 @@
                         <a:bodyPr/>
                         <a:lstStyle/>
                         <a:p>
+                          <a:pPr/>
                           <a14:m>
                             <m:oMathPara xmlns:m="http://schemas.openxmlformats.org/officeDocument/2006/math">
                               <m:oMathParaPr>
@@ -16873,6 +16924,7 @@
                           </a:endParaRPr>
                         </a:p>
                         <a:p>
+                          <a:pPr/>
                           <a14:m>
                             <m:oMathPara xmlns:m="http://schemas.openxmlformats.org/officeDocument/2006/math">
                               <m:oMathParaPr>
@@ -16940,6 +16992,7 @@
                         <a:bodyPr/>
                         <a:lstStyle/>
                         <a:p>
+                          <a:pPr/>
                           <a14:m>
                             <m:oMathPara xmlns:m="http://schemas.openxmlformats.org/officeDocument/2006/math">
                               <m:oMathParaPr>
@@ -17100,7 +17153,7 @@
             </a:graphic>
           </p:graphicFrame>
         </mc:Choice>
-        <mc:Fallback>
+        <mc:Fallback xmlns="">
           <p:graphicFrame>
             <p:nvGraphicFramePr>
               <p:cNvPr id="15" name="Table 15">
@@ -17719,8 +17772,8 @@
           </a:p>
         </p:txBody>
       </p:sp>
-      <mc:AlternateContent xmlns:mc="http://schemas.openxmlformats.org/markup-compatibility/2006">
-        <mc:Choice xmlns:a14="http://schemas.microsoft.com/office/drawing/2010/main" Requires="a14">
+      <mc:AlternateContent xmlns:mc="http://schemas.openxmlformats.org/markup-compatibility/2006" xmlns:a14="http://schemas.microsoft.com/office/drawing/2010/main">
+        <mc:Choice Requires="a14">
           <p:graphicFrame>
             <p:nvGraphicFramePr>
               <p:cNvPr id="15" name="Table 15">
@@ -17820,6 +17873,7 @@
                         <a:bodyPr/>
                         <a:lstStyle/>
                         <a:p>
+                          <a:pPr/>
                           <a14:m>
                             <m:oMathPara xmlns:m="http://schemas.openxmlformats.org/officeDocument/2006/math">
                               <m:oMathParaPr>
@@ -17890,6 +17944,7 @@
                           </a:endParaRPr>
                         </a:p>
                         <a:p>
+                          <a:pPr/>
                           <a14:m>
                             <m:oMathPara xmlns:m="http://schemas.openxmlformats.org/officeDocument/2006/math">
                               <m:oMathParaPr>
@@ -18024,6 +18079,7 @@
                         <a:bodyPr/>
                         <a:lstStyle/>
                         <a:p>
+                          <a:pPr/>
                           <a14:m>
                             <m:oMathPara xmlns:m="http://schemas.openxmlformats.org/officeDocument/2006/math">
                               <m:oMathParaPr>
@@ -18177,7 +18233,7 @@
             </a:graphic>
           </p:graphicFrame>
         </mc:Choice>
-        <mc:Fallback>
+        <mc:Fallback xmlns="">
           <p:graphicFrame>
             <p:nvGraphicFramePr>
               <p:cNvPr id="15" name="Table 15">
@@ -18748,8 +18804,8 @@
           </a:p>
         </p:txBody>
       </p:sp>
-      <mc:AlternateContent xmlns:mc="http://schemas.openxmlformats.org/markup-compatibility/2006">
-        <mc:Choice xmlns:a14="http://schemas.microsoft.com/office/drawing/2010/main" Requires="a14">
+      <mc:AlternateContent xmlns:mc="http://schemas.openxmlformats.org/markup-compatibility/2006" xmlns:a14="http://schemas.microsoft.com/office/drawing/2010/main">
+        <mc:Choice Requires="a14">
           <p:graphicFrame>
             <p:nvGraphicFramePr>
               <p:cNvPr id="15" name="Table 15">
@@ -18812,6 +18868,7 @@
                           </a:r>
                         </a:p>
                         <a:p>
+                          <a:pPr/>
                           <a14:m>
                             <m:oMathPara xmlns:m="http://schemas.openxmlformats.org/officeDocument/2006/math">
                               <m:oMathParaPr>
@@ -18890,6 +18947,7 @@
                           </a:endParaRPr>
                         </a:p>
                         <a:p>
+                          <a:pPr/>
                           <a14:m>
                             <m:oMathPara xmlns:m="http://schemas.openxmlformats.org/officeDocument/2006/math">
                               <m:oMathParaPr>
@@ -18973,6 +19031,7 @@
                         <a:bodyPr/>
                         <a:lstStyle/>
                         <a:p>
+                          <a:pPr/>
                           <a14:m>
                             <m:oMathPara xmlns:m="http://schemas.openxmlformats.org/officeDocument/2006/math">
                               <m:oMathParaPr>
@@ -19040,6 +19099,7 @@
                         <a:bodyPr/>
                         <a:lstStyle/>
                         <a:p>
+                          <a:pPr/>
                           <a14:m>
                             <m:oMathPara xmlns:m="http://schemas.openxmlformats.org/officeDocument/2006/math">
                               <m:oMathParaPr>
@@ -19229,7 +19289,7 @@
             </a:graphic>
           </p:graphicFrame>
         </mc:Choice>
-        <mc:Fallback>
+        <mc:Fallback xmlns="">
           <p:graphicFrame>
             <p:nvGraphicFramePr>
               <p:cNvPr id="15" name="Table 15">

</xml_diff>